<commit_message>
documentation of plugin architecture
</commit_message>
<xml_diff>
--- a/template.pptx
+++ b/template.pptx
@@ -200,7 +200,7 @@
           <a:p>
             <a:fld id="{E7B118ED-BCD0-4E21-BF08-51644D196BEE}" type="datetimeFigureOut">
               <a:rPr lang="en-IN" smtClean="0"/>
-              <a:t>28-01-2023</a:t>
+              <a:t>30-03-2023</a:t>
             </a:fld>
             <a:endParaRPr lang="en-IN"/>
           </a:p>
@@ -599,7 +599,7 @@
           <a:p>
             <a:fld id="{7CCC1023-8BBC-4D4A-9D55-FAC06BB2FC5A}" type="datetimeFigureOut">
               <a:rPr lang="en-IN" smtClean="0"/>
-              <a:t>28-01-2023</a:t>
+              <a:t>30-03-2023</a:t>
             </a:fld>
             <a:endParaRPr lang="en-IN"/>
           </a:p>
@@ -769,7 +769,7 @@
           <a:p>
             <a:fld id="{7CCC1023-8BBC-4D4A-9D55-FAC06BB2FC5A}" type="datetimeFigureOut">
               <a:rPr lang="en-IN" smtClean="0"/>
-              <a:t>28-01-2023</a:t>
+              <a:t>30-03-2023</a:t>
             </a:fld>
             <a:endParaRPr lang="en-IN"/>
           </a:p>
@@ -949,7 +949,7 @@
           <a:p>
             <a:fld id="{7CCC1023-8BBC-4D4A-9D55-FAC06BB2FC5A}" type="datetimeFigureOut">
               <a:rPr lang="en-IN" smtClean="0"/>
-              <a:t>28-01-2023</a:t>
+              <a:t>30-03-2023</a:t>
             </a:fld>
             <a:endParaRPr lang="en-IN"/>
           </a:p>
@@ -1119,7 +1119,7 @@
           <a:p>
             <a:fld id="{7CCC1023-8BBC-4D4A-9D55-FAC06BB2FC5A}" type="datetimeFigureOut">
               <a:rPr lang="en-IN" smtClean="0"/>
-              <a:t>28-01-2023</a:t>
+              <a:t>30-03-2023</a:t>
             </a:fld>
             <a:endParaRPr lang="en-IN"/>
           </a:p>
@@ -1365,7 +1365,7 @@
           <a:p>
             <a:fld id="{7CCC1023-8BBC-4D4A-9D55-FAC06BB2FC5A}" type="datetimeFigureOut">
               <a:rPr lang="en-IN" smtClean="0"/>
-              <a:t>28-01-2023</a:t>
+              <a:t>30-03-2023</a:t>
             </a:fld>
             <a:endParaRPr lang="en-IN"/>
           </a:p>
@@ -1597,7 +1597,7 @@
           <a:p>
             <a:fld id="{7CCC1023-8BBC-4D4A-9D55-FAC06BB2FC5A}" type="datetimeFigureOut">
               <a:rPr lang="en-IN" smtClean="0"/>
-              <a:t>28-01-2023</a:t>
+              <a:t>30-03-2023</a:t>
             </a:fld>
             <a:endParaRPr lang="en-IN"/>
           </a:p>
@@ -1964,7 +1964,7 @@
           <a:p>
             <a:fld id="{7CCC1023-8BBC-4D4A-9D55-FAC06BB2FC5A}" type="datetimeFigureOut">
               <a:rPr lang="en-IN" smtClean="0"/>
-              <a:t>28-01-2023</a:t>
+              <a:t>30-03-2023</a:t>
             </a:fld>
             <a:endParaRPr lang="en-IN"/>
           </a:p>
@@ -2082,7 +2082,7 @@
           <a:p>
             <a:fld id="{7CCC1023-8BBC-4D4A-9D55-FAC06BB2FC5A}" type="datetimeFigureOut">
               <a:rPr lang="en-IN" smtClean="0"/>
-              <a:t>28-01-2023</a:t>
+              <a:t>30-03-2023</a:t>
             </a:fld>
             <a:endParaRPr lang="en-IN"/>
           </a:p>
@@ -2177,7 +2177,7 @@
           <a:p>
             <a:fld id="{7CCC1023-8BBC-4D4A-9D55-FAC06BB2FC5A}" type="datetimeFigureOut">
               <a:rPr lang="en-IN" smtClean="0"/>
-              <a:t>28-01-2023</a:t>
+              <a:t>30-03-2023</a:t>
             </a:fld>
             <a:endParaRPr lang="en-IN"/>
           </a:p>
@@ -2454,7 +2454,7 @@
           <a:p>
             <a:fld id="{7CCC1023-8BBC-4D4A-9D55-FAC06BB2FC5A}" type="datetimeFigureOut">
               <a:rPr lang="en-IN" smtClean="0"/>
-              <a:t>28-01-2023</a:t>
+              <a:t>30-03-2023</a:t>
             </a:fld>
             <a:endParaRPr lang="en-IN"/>
           </a:p>
@@ -2707,7 +2707,7 @@
           <a:p>
             <a:fld id="{7CCC1023-8BBC-4D4A-9D55-FAC06BB2FC5A}" type="datetimeFigureOut">
               <a:rPr lang="en-IN" smtClean="0"/>
-              <a:t>28-01-2023</a:t>
+              <a:t>30-03-2023</a:t>
             </a:fld>
             <a:endParaRPr lang="en-IN"/>
           </a:p>
@@ -2920,7 +2920,7 @@
           <a:p>
             <a:fld id="{7CCC1023-8BBC-4D4A-9D55-FAC06BB2FC5A}" type="datetimeFigureOut">
               <a:rPr lang="en-IN" smtClean="0"/>
-              <a:t>28-01-2023</a:t>
+              <a:t>30-03-2023</a:t>
             </a:fld>
             <a:endParaRPr lang="en-IN"/>
           </a:p>
@@ -3453,8 +3453,8 @@
               <a:t>mytable:table</a:t>
             </a:r>
             <a:r>
-              <a:rPr lang="en-IN" dirty="0" smtClean="0"/>
-              <a:t>}}}</a:t>
+              <a:rPr lang="en-IN" smtClean="0"/>
+              <a:t>()}}}</a:t>
             </a:r>
             <a:endParaRPr lang="en-IN" dirty="0"/>
           </a:p>
@@ -3501,13 +3501,14 @@
               <a:t>{{{</a:t>
             </a:r>
             <a:r>
-              <a:rPr lang="en-IN" dirty="0" err="1"/>
+              <a:rPr lang="en-IN" dirty="0" err="1" smtClean="0"/>
               <a:t>myimage:image</a:t>
             </a:r>
             <a:r>
-              <a:rPr lang="en-IN" dirty="0"/>
-              <a:t>}}}</a:t>
-            </a:r>
+              <a:rPr lang="en-IN" dirty="0" smtClean="0"/>
+              <a:t>()}}}</a:t>
+            </a:r>
+            <a:endParaRPr lang="en-IN" dirty="0"/>
           </a:p>
           <a:p>
             <a:pPr algn="ctr"/>

</xml_diff>